<commit_message>
Adding to goals section.
</commit_message>
<xml_diff>
--- a/docs/Mockups/First Draft/Draft Goals Additional.pptx
+++ b/docs/Mockups/First Draft/Draft Goals Additional.pptx
@@ -288,7 +288,7 @@
           <a:p>
             <a:fld id="{ECB3C1DC-EE09-436C-876C-1E4BB35BFE0C}" type="datetimeFigureOut">
               <a:rPr lang="en-US" smtClean="0"/>
-              <a:t>1/16/2014</a:t>
+              <a:t>1/18/2014</a:t>
             </a:fld>
             <a:endParaRPr lang="en-US"/>
           </a:p>
@@ -458,7 +458,7 @@
           <a:p>
             <a:fld id="{ECB3C1DC-EE09-436C-876C-1E4BB35BFE0C}" type="datetimeFigureOut">
               <a:rPr lang="en-US" smtClean="0"/>
-              <a:t>1/16/2014</a:t>
+              <a:t>1/18/2014</a:t>
             </a:fld>
             <a:endParaRPr lang="en-US"/>
           </a:p>
@@ -638,7 +638,7 @@
           <a:p>
             <a:fld id="{ECB3C1DC-EE09-436C-876C-1E4BB35BFE0C}" type="datetimeFigureOut">
               <a:rPr lang="en-US" smtClean="0"/>
-              <a:t>1/16/2014</a:t>
+              <a:t>1/18/2014</a:t>
             </a:fld>
             <a:endParaRPr lang="en-US"/>
           </a:p>
@@ -808,7 +808,7 @@
           <a:p>
             <a:fld id="{ECB3C1DC-EE09-436C-876C-1E4BB35BFE0C}" type="datetimeFigureOut">
               <a:rPr lang="en-US" smtClean="0"/>
-              <a:t>1/16/2014</a:t>
+              <a:t>1/18/2014</a:t>
             </a:fld>
             <a:endParaRPr lang="en-US"/>
           </a:p>
@@ -1054,7 +1054,7 @@
           <a:p>
             <a:fld id="{ECB3C1DC-EE09-436C-876C-1E4BB35BFE0C}" type="datetimeFigureOut">
               <a:rPr lang="en-US" smtClean="0"/>
-              <a:t>1/16/2014</a:t>
+              <a:t>1/18/2014</a:t>
             </a:fld>
             <a:endParaRPr lang="en-US"/>
           </a:p>
@@ -1342,7 +1342,7 @@
           <a:p>
             <a:fld id="{ECB3C1DC-EE09-436C-876C-1E4BB35BFE0C}" type="datetimeFigureOut">
               <a:rPr lang="en-US" smtClean="0"/>
-              <a:t>1/16/2014</a:t>
+              <a:t>1/18/2014</a:t>
             </a:fld>
             <a:endParaRPr lang="en-US"/>
           </a:p>
@@ -1764,7 +1764,7 @@
           <a:p>
             <a:fld id="{ECB3C1DC-EE09-436C-876C-1E4BB35BFE0C}" type="datetimeFigureOut">
               <a:rPr lang="en-US" smtClean="0"/>
-              <a:t>1/16/2014</a:t>
+              <a:t>1/18/2014</a:t>
             </a:fld>
             <a:endParaRPr lang="en-US"/>
           </a:p>
@@ -1882,7 +1882,7 @@
           <a:p>
             <a:fld id="{ECB3C1DC-EE09-436C-876C-1E4BB35BFE0C}" type="datetimeFigureOut">
               <a:rPr lang="en-US" smtClean="0"/>
-              <a:t>1/16/2014</a:t>
+              <a:t>1/18/2014</a:t>
             </a:fld>
             <a:endParaRPr lang="en-US"/>
           </a:p>
@@ -1977,7 +1977,7 @@
           <a:p>
             <a:fld id="{ECB3C1DC-EE09-436C-876C-1E4BB35BFE0C}" type="datetimeFigureOut">
               <a:rPr lang="en-US" smtClean="0"/>
-              <a:t>1/16/2014</a:t>
+              <a:t>1/18/2014</a:t>
             </a:fld>
             <a:endParaRPr lang="en-US"/>
           </a:p>
@@ -2254,7 +2254,7 @@
           <a:p>
             <a:fld id="{ECB3C1DC-EE09-436C-876C-1E4BB35BFE0C}" type="datetimeFigureOut">
               <a:rPr lang="en-US" smtClean="0"/>
-              <a:t>1/16/2014</a:t>
+              <a:t>1/18/2014</a:t>
             </a:fld>
             <a:endParaRPr lang="en-US"/>
           </a:p>
@@ -2507,7 +2507,7 @@
           <a:p>
             <a:fld id="{ECB3C1DC-EE09-436C-876C-1E4BB35BFE0C}" type="datetimeFigureOut">
               <a:rPr lang="en-US" smtClean="0"/>
-              <a:t>1/16/2014</a:t>
+              <a:t>1/18/2014</a:t>
             </a:fld>
             <a:endParaRPr lang="en-US"/>
           </a:p>
@@ -2720,7 +2720,7 @@
           <a:p>
             <a:fld id="{ECB3C1DC-EE09-436C-876C-1E4BB35BFE0C}" type="datetimeFigureOut">
               <a:rPr lang="en-US" smtClean="0"/>
-              <a:t>1/16/2014</a:t>
+              <a:t>1/18/2014</a:t>
             </a:fld>
             <a:endParaRPr lang="en-US"/>
           </a:p>
@@ -3376,19 +3376,7 @@
                 </a:solidFill>
                 <a:latin typeface="Calibri Light" panose="020F0302020204030204" pitchFamily="34" charset="0"/>
               </a:rPr>
-              <a:t>I </a:t>
-            </a:r>
-            <a:r>
-              <a:rPr lang="en-US" dirty="0" smtClean="0">
-                <a:solidFill>
-                  <a:schemeClr val="tx1">
-                    <a:lumMod val="50000"/>
-                    <a:lumOff val="50000"/>
-                  </a:schemeClr>
-                </a:solidFill>
-                <a:latin typeface="Calibri Light" panose="020F0302020204030204" pitchFamily="34" charset="0"/>
-              </a:rPr>
-              <a:t>will do this exercise for</a:t>
+              <a:t>I will do this exercise for</a:t>
             </a:r>
             <a:endParaRPr lang="en-US" dirty="0">
               <a:solidFill>
@@ -3578,7 +3566,7 @@
         </p:nvSpPr>
         <p:spPr>
           <a:xfrm>
-            <a:off x="6496047" y="4656714"/>
+            <a:off x="6483325" y="4008595"/>
             <a:ext cx="361950" cy="369332"/>
           </a:xfrm>
           <a:prstGeom prst="rect">
@@ -3680,142 +3668,6 @@
           </a:p>
         </p:txBody>
       </p:sp>
-      <p:sp>
-        <p:nvSpPr>
-          <p:cNvPr id="37" name="Oval 36"/>
-          <p:cNvSpPr/>
-          <p:nvPr/>
-        </p:nvSpPr>
-        <p:spPr>
-          <a:xfrm>
-            <a:off x="6854022" y="4579871"/>
-            <a:ext cx="457200" cy="442050"/>
-          </a:xfrm>
-          <a:prstGeom prst="ellipse">
-            <a:avLst/>
-          </a:prstGeom>
-          <a:solidFill>
-            <a:schemeClr val="bg1"/>
-          </a:solidFill>
-          <a:ln w="12700">
-            <a:solidFill>
-              <a:schemeClr val="tx1">
-                <a:lumMod val="50000"/>
-                <a:lumOff val="50000"/>
-              </a:schemeClr>
-            </a:solidFill>
-          </a:ln>
-        </p:spPr>
-        <p:style>
-          <a:lnRef idx="2">
-            <a:schemeClr val="accent1">
-              <a:shade val="50000"/>
-            </a:schemeClr>
-          </a:lnRef>
-          <a:fillRef idx="1">
-            <a:schemeClr val="accent1"/>
-          </a:fillRef>
-          <a:effectRef idx="0">
-            <a:schemeClr val="accent1"/>
-          </a:effectRef>
-          <a:fontRef idx="minor">
-            <a:schemeClr val="lt1"/>
-          </a:fontRef>
-        </p:style>
-        <p:txBody>
-          <a:bodyPr rtlCol="0" anchor="ctr"/>
-          <a:lstStyle/>
-          <a:p>
-            <a:pPr algn="ctr"/>
-            <a:endParaRPr lang="en-US" dirty="0" smtClean="0">
-              <a:solidFill>
-                <a:schemeClr val="tx1">
-                  <a:lumMod val="50000"/>
-                  <a:lumOff val="50000"/>
-                </a:schemeClr>
-              </a:solidFill>
-            </a:endParaRPr>
-          </a:p>
-        </p:txBody>
-      </p:sp>
-      <p:cxnSp>
-        <p:nvCxnSpPr>
-          <p:cNvPr id="41" name="Straight Connector 40"/>
-          <p:cNvCxnSpPr>
-            <a:stCxn id="37" idx="0"/>
-          </p:cNvCxnSpPr>
-          <p:nvPr/>
-        </p:nvCxnSpPr>
-        <p:spPr>
-          <a:xfrm>
-            <a:off x="7082622" y="4579871"/>
-            <a:ext cx="0" cy="221025"/>
-          </a:xfrm>
-          <a:prstGeom prst="line">
-            <a:avLst/>
-          </a:prstGeom>
-          <a:ln w="12700">
-            <a:solidFill>
-              <a:schemeClr val="tx1">
-                <a:lumMod val="50000"/>
-                <a:lumOff val="50000"/>
-              </a:schemeClr>
-            </a:solidFill>
-          </a:ln>
-        </p:spPr>
-        <p:style>
-          <a:lnRef idx="1">
-            <a:schemeClr val="accent1"/>
-          </a:lnRef>
-          <a:fillRef idx="0">
-            <a:schemeClr val="accent1"/>
-          </a:fillRef>
-          <a:effectRef idx="0">
-            <a:schemeClr val="accent1"/>
-          </a:effectRef>
-          <a:fontRef idx="minor">
-            <a:schemeClr val="tx1"/>
-          </a:fontRef>
-        </p:style>
-      </p:cxnSp>
-      <p:cxnSp>
-        <p:nvCxnSpPr>
-          <p:cNvPr id="50" name="Straight Connector 49"/>
-          <p:cNvCxnSpPr/>
-          <p:nvPr/>
-        </p:nvCxnSpPr>
-        <p:spPr>
-          <a:xfrm flipH="1">
-            <a:off x="6968320" y="4800896"/>
-            <a:ext cx="114302" cy="47554"/>
-          </a:xfrm>
-          <a:prstGeom prst="line">
-            <a:avLst/>
-          </a:prstGeom>
-          <a:ln w="12700">
-            <a:solidFill>
-              <a:schemeClr val="tx1">
-                <a:lumMod val="50000"/>
-                <a:lumOff val="50000"/>
-              </a:schemeClr>
-            </a:solidFill>
-          </a:ln>
-        </p:spPr>
-        <p:style>
-          <a:lnRef idx="1">
-            <a:schemeClr val="accent1"/>
-          </a:lnRef>
-          <a:fillRef idx="0">
-            <a:schemeClr val="accent1"/>
-          </a:fillRef>
-          <a:effectRef idx="0">
-            <a:schemeClr val="accent1"/>
-          </a:effectRef>
-          <a:fontRef idx="minor">
-            <a:schemeClr val="tx1"/>
-          </a:fontRef>
-        </p:style>
-      </p:cxnSp>
       <p:sp>
         <p:nvSpPr>
           <p:cNvPr id="75" name="Rounded Rectangle 74"/>

</xml_diff>